<commit_message>
3 node NEURON graphs
</commit_message>
<xml_diff>
--- a/figs/updates.pptx
+++ b/figs/updates.pptx
@@ -115,6 +115,11 @@
       </a:defRPr>
     </a:lvl9pPr>
   </p:defaultTextStyle>
+  <p:extLst>
+    <p:ext uri="{EFAFB233-063F-42B5-8137-9DF3F51BA10A}">
+      <p15:sldGuideLst xmlns:p15="http://schemas.microsoft.com/office/powerpoint/2012/main"/>
+    </p:ext>
+  </p:extLst>
 </p:presentation>
 </file>
 
@@ -265,7 +270,7 @@
           <a:p>
             <a:fld id="{43D412B0-50CD-2C4C-A70E-4EA40F109903}" type="datetimeFigureOut">
               <a:rPr lang="en-US" smtClean="0"/>
-              <a:t>9/3/25</a:t>
+              <a:t>9/10/25</a:t>
             </a:fld>
             <a:endParaRPr lang="en-US"/>
           </a:p>
@@ -463,7 +468,7 @@
           <a:p>
             <a:fld id="{43D412B0-50CD-2C4C-A70E-4EA40F109903}" type="datetimeFigureOut">
               <a:rPr lang="en-US" smtClean="0"/>
-              <a:t>9/3/25</a:t>
+              <a:t>9/10/25</a:t>
             </a:fld>
             <a:endParaRPr lang="en-US"/>
           </a:p>
@@ -671,7 +676,7 @@
           <a:p>
             <a:fld id="{43D412B0-50CD-2C4C-A70E-4EA40F109903}" type="datetimeFigureOut">
               <a:rPr lang="en-US" smtClean="0"/>
-              <a:t>9/3/25</a:t>
+              <a:t>9/10/25</a:t>
             </a:fld>
             <a:endParaRPr lang="en-US"/>
           </a:p>
@@ -869,7 +874,7 @@
           <a:p>
             <a:fld id="{43D412B0-50CD-2C4C-A70E-4EA40F109903}" type="datetimeFigureOut">
               <a:rPr lang="en-US" smtClean="0"/>
-              <a:t>9/3/25</a:t>
+              <a:t>9/10/25</a:t>
             </a:fld>
             <a:endParaRPr lang="en-US"/>
           </a:p>
@@ -1144,7 +1149,7 @@
           <a:p>
             <a:fld id="{43D412B0-50CD-2C4C-A70E-4EA40F109903}" type="datetimeFigureOut">
               <a:rPr lang="en-US" smtClean="0"/>
-              <a:t>9/3/25</a:t>
+              <a:t>9/10/25</a:t>
             </a:fld>
             <a:endParaRPr lang="en-US"/>
           </a:p>
@@ -1409,7 +1414,7 @@
           <a:p>
             <a:fld id="{43D412B0-50CD-2C4C-A70E-4EA40F109903}" type="datetimeFigureOut">
               <a:rPr lang="en-US" smtClean="0"/>
-              <a:t>9/3/25</a:t>
+              <a:t>9/10/25</a:t>
             </a:fld>
             <a:endParaRPr lang="en-US"/>
           </a:p>
@@ -1821,7 +1826,7 @@
           <a:p>
             <a:fld id="{43D412B0-50CD-2C4C-A70E-4EA40F109903}" type="datetimeFigureOut">
               <a:rPr lang="en-US" smtClean="0"/>
-              <a:t>9/3/25</a:t>
+              <a:t>9/10/25</a:t>
             </a:fld>
             <a:endParaRPr lang="en-US"/>
           </a:p>
@@ -1962,7 +1967,7 @@
           <a:p>
             <a:fld id="{43D412B0-50CD-2C4C-A70E-4EA40F109903}" type="datetimeFigureOut">
               <a:rPr lang="en-US" smtClean="0"/>
-              <a:t>9/3/25</a:t>
+              <a:t>9/10/25</a:t>
             </a:fld>
             <a:endParaRPr lang="en-US"/>
           </a:p>
@@ -2075,7 +2080,7 @@
           <a:p>
             <a:fld id="{43D412B0-50CD-2C4C-A70E-4EA40F109903}" type="datetimeFigureOut">
               <a:rPr lang="en-US" smtClean="0"/>
-              <a:t>9/3/25</a:t>
+              <a:t>9/10/25</a:t>
             </a:fld>
             <a:endParaRPr lang="en-US"/>
           </a:p>
@@ -2386,7 +2391,7 @@
           <a:p>
             <a:fld id="{43D412B0-50CD-2C4C-A70E-4EA40F109903}" type="datetimeFigureOut">
               <a:rPr lang="en-US" smtClean="0"/>
-              <a:t>9/3/25</a:t>
+              <a:t>9/10/25</a:t>
             </a:fld>
             <a:endParaRPr lang="en-US"/>
           </a:p>
@@ -2674,7 +2679,7 @@
           <a:p>
             <a:fld id="{43D412B0-50CD-2C4C-A70E-4EA40F109903}" type="datetimeFigureOut">
               <a:rPr lang="en-US" smtClean="0"/>
-              <a:t>9/3/25</a:t>
+              <a:t>9/10/25</a:t>
             </a:fld>
             <a:endParaRPr lang="en-US"/>
           </a:p>
@@ -2915,7 +2920,7 @@
           <a:p>
             <a:fld id="{43D412B0-50CD-2C4C-A70E-4EA40F109903}" type="datetimeFigureOut">
               <a:rPr lang="en-US" smtClean="0"/>
-              <a:t>9/3/25</a:t>
+              <a:t>9/10/25</a:t>
             </a:fld>
             <a:endParaRPr lang="en-US"/>
           </a:p>
@@ -3901,178 +3906,220 @@
           </a:p>
         </p:txBody>
       </p:sp>
-      <p:pic>
-        <p:nvPicPr>
-          <p:cNvPr id="8194" name="Picture 2">
-            <a:extLst>
-              <a:ext uri="{FF2B5EF4-FFF2-40B4-BE49-F238E27FC236}">
-                <a16:creationId xmlns:a16="http://schemas.microsoft.com/office/drawing/2014/main" id="{BD6907C7-C8B1-591B-331B-BE38EC224AC6}"/>
-              </a:ext>
-            </a:extLst>
-          </p:cNvPr>
-          <p:cNvPicPr>
-            <a:picLocks noChangeAspect="1" noChangeArrowheads="1"/>
-          </p:cNvPicPr>
+      <p:grpSp>
+        <p:nvGrpSpPr>
+          <p:cNvPr id="6" name="Group 5">
+            <a:extLst>
+              <a:ext uri="{FF2B5EF4-FFF2-40B4-BE49-F238E27FC236}">
+                <a16:creationId xmlns:a16="http://schemas.microsoft.com/office/drawing/2014/main" id="{A50D25EF-11FC-DB82-B470-1D6CB1F1C0D9}"/>
+              </a:ext>
+            </a:extLst>
+          </p:cNvPr>
+          <p:cNvGrpSpPr/>
           <p:nvPr/>
-        </p:nvPicPr>
-        <p:blipFill>
-          <a:blip r:embed="rId2">
-            <a:extLst>
-              <a:ext uri="{28A0092B-C50C-407E-A947-70E740481C1C}">
-                <a14:useLocalDpi xmlns:a14="http://schemas.microsoft.com/office/drawing/2010/main" val="0"/>
-              </a:ext>
-            </a:extLst>
-          </a:blip>
-          <a:srcRect/>
-          <a:stretch>
-            <a:fillRect/>
-          </a:stretch>
-        </p:blipFill>
-        <p:spPr bwMode="auto">
+        </p:nvGrpSpPr>
+        <p:grpSpPr>
           <a:xfrm>
             <a:off x="8041821" y="245823"/>
             <a:ext cx="3214007" cy="3183177"/>
+            <a:chOff x="8041821" y="245823"/>
+            <a:chExt cx="3214007" cy="3183177"/>
           </a:xfrm>
-          <a:prstGeom prst="rect">
-            <a:avLst/>
-          </a:prstGeom>
-          <a:noFill/>
-          <a:extLst>
-            <a:ext uri="{909E8E84-426E-40DD-AFC4-6F175D3DCCD1}">
-              <a14:hiddenFill xmlns:a14="http://schemas.microsoft.com/office/drawing/2010/main">
-                <a:solidFill>
-                  <a:srgbClr val="FFFFFF"/>
-                </a:solidFill>
-              </a14:hiddenFill>
-            </a:ext>
-          </a:extLst>
-        </p:spPr>
-      </p:pic>
-      <p:pic>
-        <p:nvPicPr>
-          <p:cNvPr id="8196" name="Picture 4">
-            <a:extLst>
-              <a:ext uri="{FF2B5EF4-FFF2-40B4-BE49-F238E27FC236}">
-                <a16:creationId xmlns:a16="http://schemas.microsoft.com/office/drawing/2014/main" id="{CFE13371-E77F-68DF-13D5-B9F89C813A63}"/>
-              </a:ext>
-            </a:extLst>
-          </p:cNvPr>
-          <p:cNvPicPr>
-            <a:picLocks noChangeAspect="1" noChangeArrowheads="1"/>
-          </p:cNvPicPr>
+        </p:grpSpPr>
+        <p:pic>
+          <p:nvPicPr>
+            <p:cNvPr id="8194" name="Picture 2">
+              <a:extLst>
+                <a:ext uri="{FF2B5EF4-FFF2-40B4-BE49-F238E27FC236}">
+                  <a16:creationId xmlns:a16="http://schemas.microsoft.com/office/drawing/2014/main" id="{BD6907C7-C8B1-591B-331B-BE38EC224AC6}"/>
+                </a:ext>
+              </a:extLst>
+            </p:cNvPr>
+            <p:cNvPicPr>
+              <a:picLocks noChangeAspect="1" noChangeArrowheads="1"/>
+            </p:cNvPicPr>
+            <p:nvPr/>
+          </p:nvPicPr>
+          <p:blipFill>
+            <a:blip r:embed="rId2">
+              <a:extLst>
+                <a:ext uri="{28A0092B-C50C-407E-A947-70E740481C1C}">
+                  <a14:useLocalDpi xmlns:a14="http://schemas.microsoft.com/office/drawing/2010/main" val="0"/>
+                </a:ext>
+              </a:extLst>
+            </a:blip>
+            <a:srcRect/>
+            <a:stretch>
+              <a:fillRect/>
+            </a:stretch>
+          </p:blipFill>
+          <p:spPr bwMode="auto">
+            <a:xfrm>
+              <a:off x="8041821" y="245823"/>
+              <a:ext cx="3214007" cy="3183177"/>
+            </a:xfrm>
+            <a:prstGeom prst="rect">
+              <a:avLst/>
+            </a:prstGeom>
+            <a:noFill/>
+            <a:extLst>
+              <a:ext uri="{909E8E84-426E-40DD-AFC4-6F175D3DCCD1}">
+                <a14:hiddenFill xmlns:a14="http://schemas.microsoft.com/office/drawing/2010/main">
+                  <a:solidFill>
+                    <a:srgbClr val="FFFFFF"/>
+                  </a:solidFill>
+                </a14:hiddenFill>
+              </a:ext>
+            </a:extLst>
+          </p:spPr>
+        </p:pic>
+        <p:sp>
+          <p:nvSpPr>
+            <p:cNvPr id="4" name="TextBox 3">
+              <a:extLst>
+                <a:ext uri="{FF2B5EF4-FFF2-40B4-BE49-F238E27FC236}">
+                  <a16:creationId xmlns:a16="http://schemas.microsoft.com/office/drawing/2014/main" id="{5AD36AE2-7A70-EC18-714E-8F971B7B9E91}"/>
+                </a:ext>
+              </a:extLst>
+            </p:cNvPr>
+            <p:cNvSpPr txBox="1"/>
+            <p:nvPr/>
+          </p:nvSpPr>
+          <p:spPr>
+            <a:xfrm>
+              <a:off x="9427029" y="2710543"/>
+              <a:ext cx="1662122" cy="369332"/>
+            </a:xfrm>
+            <a:prstGeom prst="rect">
+              <a:avLst/>
+            </a:prstGeom>
+            <a:noFill/>
+          </p:spPr>
+          <p:txBody>
+            <a:bodyPr wrap="none" rtlCol="0">
+              <a:spAutoFit/>
+            </a:bodyPr>
+            <a:lstStyle/>
+            <a:p>
+              <a:r>
+                <a:rPr lang="en-US" dirty="0">
+                  <a:solidFill>
+                    <a:schemeClr val="bg1"/>
+                  </a:solidFill>
+                </a:rPr>
+                <a:t>Contains cycle</a:t>
+              </a:r>
+            </a:p>
+          </p:txBody>
+        </p:sp>
+      </p:grpSp>
+      <p:grpSp>
+        <p:nvGrpSpPr>
+          <p:cNvPr id="7" name="Group 6">
+            <a:extLst>
+              <a:ext uri="{FF2B5EF4-FFF2-40B4-BE49-F238E27FC236}">
+                <a16:creationId xmlns:a16="http://schemas.microsoft.com/office/drawing/2014/main" id="{7B4435C3-5F70-DF79-D0B3-D09F508AAD0E}"/>
+              </a:ext>
+            </a:extLst>
+          </p:cNvPr>
+          <p:cNvGrpSpPr/>
           <p:nvPr/>
-        </p:nvPicPr>
-        <p:blipFill>
-          <a:blip r:embed="rId3">
-            <a:extLst>
-              <a:ext uri="{28A0092B-C50C-407E-A947-70E740481C1C}">
-                <a14:useLocalDpi xmlns:a14="http://schemas.microsoft.com/office/drawing/2010/main" val="0"/>
-              </a:ext>
-            </a:extLst>
-          </a:blip>
-          <a:srcRect/>
-          <a:stretch>
-            <a:fillRect/>
-          </a:stretch>
-        </p:blipFill>
-        <p:spPr bwMode="auto">
+        </p:nvGrpSpPr>
+        <p:grpSpPr>
           <a:xfrm>
             <a:off x="8041821" y="3548302"/>
             <a:ext cx="3214007" cy="3183177"/>
+            <a:chOff x="8041821" y="3548302"/>
+            <a:chExt cx="3214007" cy="3183177"/>
           </a:xfrm>
-          <a:prstGeom prst="rect">
-            <a:avLst/>
-          </a:prstGeom>
-          <a:noFill/>
-          <a:extLst>
-            <a:ext uri="{909E8E84-426E-40DD-AFC4-6F175D3DCCD1}">
-              <a14:hiddenFill xmlns:a14="http://schemas.microsoft.com/office/drawing/2010/main">
-                <a:solidFill>
-                  <a:srgbClr val="FFFFFF"/>
-                </a:solidFill>
-              </a14:hiddenFill>
-            </a:ext>
-          </a:extLst>
-        </p:spPr>
-      </p:pic>
-      <p:sp>
-        <p:nvSpPr>
-          <p:cNvPr id="4" name="TextBox 3">
-            <a:extLst>
-              <a:ext uri="{FF2B5EF4-FFF2-40B4-BE49-F238E27FC236}">
-                <a16:creationId xmlns:a16="http://schemas.microsoft.com/office/drawing/2014/main" id="{5AD36AE2-7A70-EC18-714E-8F971B7B9E91}"/>
-              </a:ext>
-            </a:extLst>
-          </p:cNvPr>
-          <p:cNvSpPr txBox="1"/>
-          <p:nvPr/>
-        </p:nvSpPr>
-        <p:spPr>
-          <a:xfrm>
-            <a:off x="9427029" y="2710543"/>
-            <a:ext cx="1662122" cy="369332"/>
-          </a:xfrm>
-          <a:prstGeom prst="rect">
-            <a:avLst/>
-          </a:prstGeom>
-          <a:noFill/>
-        </p:spPr>
-        <p:txBody>
-          <a:bodyPr wrap="none" rtlCol="0">
-            <a:spAutoFit/>
-          </a:bodyPr>
-          <a:lstStyle/>
-          <a:p>
-            <a:r>
-              <a:rPr lang="en-US" dirty="0">
-                <a:solidFill>
-                  <a:schemeClr val="bg1"/>
-                </a:solidFill>
-              </a:rPr>
-              <a:t>Contains cycle</a:t>
-            </a:r>
-          </a:p>
-        </p:txBody>
-      </p:sp>
-      <p:sp>
-        <p:nvSpPr>
-          <p:cNvPr id="5" name="TextBox 4">
-            <a:extLst>
-              <a:ext uri="{FF2B5EF4-FFF2-40B4-BE49-F238E27FC236}">
-                <a16:creationId xmlns:a16="http://schemas.microsoft.com/office/drawing/2014/main" id="{BC5393F9-F6EF-479F-FBE8-051EF26D9F04}"/>
-              </a:ext>
-            </a:extLst>
-          </p:cNvPr>
-          <p:cNvSpPr txBox="1"/>
-          <p:nvPr/>
-        </p:nvSpPr>
-        <p:spPr>
-          <a:xfrm>
-            <a:off x="9941144" y="6012645"/>
-            <a:ext cx="633891" cy="369332"/>
-          </a:xfrm>
-          <a:prstGeom prst="rect">
-            <a:avLst/>
-          </a:prstGeom>
-          <a:noFill/>
-        </p:spPr>
-        <p:txBody>
-          <a:bodyPr wrap="none" rtlCol="0">
-            <a:spAutoFit/>
-          </a:bodyPr>
-          <a:lstStyle/>
-          <a:p>
-            <a:r>
-              <a:rPr lang="en-US" dirty="0">
-                <a:solidFill>
-                  <a:schemeClr val="bg1"/>
-                </a:solidFill>
-              </a:rPr>
-              <a:t>DAG</a:t>
-            </a:r>
-          </a:p>
-        </p:txBody>
-      </p:sp>
+        </p:grpSpPr>
+        <p:pic>
+          <p:nvPicPr>
+            <p:cNvPr id="8196" name="Picture 4">
+              <a:extLst>
+                <a:ext uri="{FF2B5EF4-FFF2-40B4-BE49-F238E27FC236}">
+                  <a16:creationId xmlns:a16="http://schemas.microsoft.com/office/drawing/2014/main" id="{CFE13371-E77F-68DF-13D5-B9F89C813A63}"/>
+                </a:ext>
+              </a:extLst>
+            </p:cNvPr>
+            <p:cNvPicPr>
+              <a:picLocks noChangeAspect="1" noChangeArrowheads="1"/>
+            </p:cNvPicPr>
+            <p:nvPr/>
+          </p:nvPicPr>
+          <p:blipFill>
+            <a:blip r:embed="rId3">
+              <a:extLst>
+                <a:ext uri="{28A0092B-C50C-407E-A947-70E740481C1C}">
+                  <a14:useLocalDpi xmlns:a14="http://schemas.microsoft.com/office/drawing/2010/main" val="0"/>
+                </a:ext>
+              </a:extLst>
+            </a:blip>
+            <a:srcRect/>
+            <a:stretch>
+              <a:fillRect/>
+            </a:stretch>
+          </p:blipFill>
+          <p:spPr bwMode="auto">
+            <a:xfrm>
+              <a:off x="8041821" y="3548302"/>
+              <a:ext cx="3214007" cy="3183177"/>
+            </a:xfrm>
+            <a:prstGeom prst="rect">
+              <a:avLst/>
+            </a:prstGeom>
+            <a:noFill/>
+            <a:extLst>
+              <a:ext uri="{909E8E84-426E-40DD-AFC4-6F175D3DCCD1}">
+                <a14:hiddenFill xmlns:a14="http://schemas.microsoft.com/office/drawing/2010/main">
+                  <a:solidFill>
+                    <a:srgbClr val="FFFFFF"/>
+                  </a:solidFill>
+                </a14:hiddenFill>
+              </a:ext>
+            </a:extLst>
+          </p:spPr>
+        </p:pic>
+        <p:sp>
+          <p:nvSpPr>
+            <p:cNvPr id="5" name="TextBox 4">
+              <a:extLst>
+                <a:ext uri="{FF2B5EF4-FFF2-40B4-BE49-F238E27FC236}">
+                  <a16:creationId xmlns:a16="http://schemas.microsoft.com/office/drawing/2014/main" id="{BC5393F9-F6EF-479F-FBE8-051EF26D9F04}"/>
+                </a:ext>
+              </a:extLst>
+            </p:cNvPr>
+            <p:cNvSpPr txBox="1"/>
+            <p:nvPr/>
+          </p:nvSpPr>
+          <p:spPr>
+            <a:xfrm>
+              <a:off x="9941144" y="6012645"/>
+              <a:ext cx="633891" cy="369332"/>
+            </a:xfrm>
+            <a:prstGeom prst="rect">
+              <a:avLst/>
+            </a:prstGeom>
+            <a:noFill/>
+          </p:spPr>
+          <p:txBody>
+            <a:bodyPr wrap="none" rtlCol="0">
+              <a:spAutoFit/>
+            </a:bodyPr>
+            <a:lstStyle/>
+            <a:p>
+              <a:r>
+                <a:rPr lang="en-US" dirty="0">
+                  <a:solidFill>
+                    <a:schemeClr val="bg1"/>
+                  </a:solidFill>
+                </a:rPr>
+                <a:t>DAG</a:t>
+              </a:r>
+            </a:p>
+          </p:txBody>
+        </p:sp>
+      </p:grpSp>
     </p:spTree>
     <p:extLst>
       <p:ext uri="{BB962C8B-B14F-4D97-AF65-F5344CB8AC3E}">

</xml_diff>